<commit_message>
Added strategy file, updated workflow diagram
</commit_message>
<xml_diff>
--- a/Documentation/Workflow.pptx
+++ b/Documentation/Workflow.pptx
@@ -3352,10 +3352,10 @@
         </p:nvGrpSpPr>
         <p:grpSpPr>
           <a:xfrm>
-            <a:off x="1753393" y="1565164"/>
-            <a:ext cx="8508903" cy="5199289"/>
+            <a:off x="1748463" y="1251637"/>
+            <a:ext cx="8695073" cy="5476288"/>
             <a:chOff x="1753393" y="1565164"/>
-            <a:chExt cx="8508903" cy="5199289"/>
+            <a:chExt cx="8695073" cy="5476288"/>
           </a:xfrm>
         </p:grpSpPr>
         <p:grpSp>
@@ -3681,10 +3681,10 @@
           </p:nvGrpSpPr>
           <p:grpSpPr>
             <a:xfrm>
-              <a:off x="8719928" y="1805306"/>
-              <a:ext cx="1538747" cy="1778411"/>
-              <a:chOff x="7440499" y="631581"/>
-              <a:chExt cx="1538747" cy="1778411"/>
+              <a:off x="8537378" y="1805306"/>
+              <a:ext cx="1911088" cy="2052537"/>
+              <a:chOff x="7257949" y="631581"/>
+              <a:chExt cx="1911088" cy="2052537"/>
             </a:xfrm>
           </p:grpSpPr>
           <p:sp>
@@ -3701,8 +3701,8 @@
             </p:nvSpPr>
             <p:spPr>
               <a:xfrm>
-                <a:off x="7440499" y="1763661"/>
-                <a:ext cx="1538747" cy="646331"/>
+                <a:off x="7257949" y="1760788"/>
+                <a:ext cx="1911088" cy="923330"/>
               </a:xfrm>
               <a:prstGeom prst="rect">
                 <a:avLst/>
@@ -3723,6 +3723,17 @@
                     </a:solidFill>
                   </a:rPr>
                   <a:t>Recipe Generator</a:t>
+                </a:r>
+              </a:p>
+              <a:p>
+                <a:pPr algn="ctr"/>
+                <a:r>
+                  <a:rPr lang="en-US" b="1" dirty="0">
+                    <a:solidFill>
+                      <a:schemeClr val="bg1"/>
+                    </a:solidFill>
+                  </a:rPr>
+                  <a:t>(gpt-oss:20b)</a:t>
                 </a:r>
               </a:p>
             </p:txBody>
@@ -3779,9 +3790,9 @@
           <p:grpSpPr>
             <a:xfrm>
               <a:off x="8723549" y="4986042"/>
-              <a:ext cx="1538747" cy="1778411"/>
+              <a:ext cx="1538747" cy="2055410"/>
               <a:chOff x="7440499" y="631581"/>
-              <a:chExt cx="1538747" cy="1778411"/>
+              <a:chExt cx="1538747" cy="2055410"/>
             </a:xfrm>
           </p:grpSpPr>
           <p:sp>
@@ -3799,7 +3810,7 @@
             <p:spPr>
               <a:xfrm>
                 <a:off x="7440499" y="1763661"/>
-                <a:ext cx="1538747" cy="646331"/>
+                <a:ext cx="1538747" cy="923330"/>
               </a:xfrm>
               <a:prstGeom prst="rect">
                 <a:avLst/>
@@ -3831,6 +3842,17 @@
                     </a:solidFill>
                   </a:rPr>
                   <a:t>Validator</a:t>
+                </a:r>
+              </a:p>
+              <a:p>
+                <a:pPr algn="ctr"/>
+                <a:r>
+                  <a:rPr lang="en-US" b="1" dirty="0">
+                    <a:solidFill>
+                      <a:schemeClr val="bg1"/>
+                    </a:solidFill>
+                  </a:rPr>
+                  <a:t>(qwen3:8b)</a:t>
                 </a:r>
               </a:p>
             </p:txBody>

</xml_diff>